<commit_message>
acpt: add scenarios for BaseShape.rotation
</commit_message>
<xml_diff>
--- a/features/steps/test_files/shp-common-props.pptx
+++ b/features/steps/test_files/shp-common-props.pptx
@@ -6,6 +6,7 @@
   </p:sldMasterIdLst>
   <p:sldIdLst>
     <p:sldId id="256" r:id="rId2"/>
+    <p:sldId id="257" r:id="rId3"/>
   </p:sldIdLst>
   <p:sldSz cx="9144000" cy="6858000" type="screen4x3"/>
   <p:notesSz cx="6858000" cy="9144000"/>
@@ -792,6 +793,385 @@
 </p:sld>
 </file>
 
+<file path=ppt/slides/slide2.xml><?xml version="1.0" encoding="utf-8"?>
+<p:sld xmlns:a="http://schemas.openxmlformats.org/drawingml/2006/main" xmlns:r="http://schemas.openxmlformats.org/officeDocument/2006/relationships" xmlns:p="http://schemas.openxmlformats.org/presentationml/2006/main">
+  <p:cSld>
+    <p:spTree>
+      <p:nvGrpSpPr>
+        <p:cNvPr id="1" name=""/>
+        <p:cNvGrpSpPr/>
+        <p:nvPr/>
+      </p:nvGrpSpPr>
+      <p:grpSpPr>
+        <a:xfrm>
+          <a:off x="0" y="0"/>
+          <a:ext cx="0" cy="0"/>
+          <a:chOff x="0" y="0"/>
+          <a:chExt cx="0" cy="0"/>
+        </a:xfrm>
+      </p:grpSpPr>
+      <p:sp>
+        <p:nvSpPr>
+          <p:cNvPr id="2" name="Rounded Rectangle 1"/>
+          <p:cNvSpPr/>
+          <p:nvPr/>
+        </p:nvSpPr>
+        <p:spPr>
+          <a:xfrm rot="600000">
+            <a:off x="1339552" y="692696"/>
+            <a:ext cx="928192" cy="914400"/>
+          </a:xfrm>
+          <a:prstGeom prst="roundRect">
+            <a:avLst/>
+          </a:prstGeom>
+        </p:spPr>
+        <p:style>
+          <a:lnRef idx="1">
+            <a:schemeClr val="accent1"/>
+          </a:lnRef>
+          <a:fillRef idx="3">
+            <a:schemeClr val="accent1"/>
+          </a:fillRef>
+          <a:effectRef idx="2">
+            <a:schemeClr val="accent1"/>
+          </a:effectRef>
+          <a:fontRef idx="minor">
+            <a:schemeClr val="lt1"/>
+          </a:fontRef>
+        </p:style>
+        <p:txBody>
+          <a:bodyPr rtlCol="0" anchor="ctr"/>
+          <a:lstStyle/>
+          <a:p>
+            <a:pPr algn="ctr"/>
+            <a:r>
+              <a:rPr lang="en-US" dirty="0" smtClean="0"/>
+              <a:t>shape</a:t>
+            </a:r>
+            <a:endParaRPr lang="en-US" dirty="0"/>
+          </a:p>
+        </p:txBody>
+      </p:sp>
+      <p:pic>
+        <p:nvPicPr>
+          <p:cNvPr id="3" name="Picture 2" descr="python-icon.jpeg"/>
+          <p:cNvPicPr>
+            <a:picLocks noChangeAspect="1"/>
+          </p:cNvPicPr>
+          <p:nvPr/>
+        </p:nvPicPr>
+        <p:blipFill>
+          <a:blip r:embed="rId2">
+            <a:extLst>
+              <a:ext uri="{28A0092B-C50C-407E-A947-70E740481C1C}">
+                <a14:useLocalDpi xmlns:a14="http://schemas.microsoft.com/office/drawing/2010/main" val="0"/>
+              </a:ext>
+            </a:extLst>
+          </a:blip>
+          <a:stretch>
+            <a:fillRect/>
+          </a:stretch>
+        </p:blipFill>
+        <p:spPr>
+          <a:xfrm rot="1200000">
+            <a:off x="2711152" y="1835696"/>
+            <a:ext cx="914400" cy="945232"/>
+          </a:xfrm>
+          <a:prstGeom prst="rect">
+            <a:avLst/>
+          </a:prstGeom>
+        </p:spPr>
+      </p:pic>
+      <p:graphicFrame>
+        <p:nvGraphicFramePr>
+          <p:cNvPr id="4" name="Table 3"/>
+          <p:cNvGraphicFramePr>
+            <a:graphicFrameLocks noGrp="1"/>
+          </p:cNvGraphicFramePr>
+          <p:nvPr>
+            <p:extLst>
+              <p:ext uri="{D42A27DB-BD31-4B8C-83A1-F6EECF244321}">
+                <p14:modId xmlns:p14="http://schemas.microsoft.com/office/powerpoint/2010/main" val="678995852"/>
+              </p:ext>
+            </p:extLst>
+          </p:nvPr>
+        </p:nvGraphicFramePr>
+        <p:xfrm>
+          <a:off x="4082752" y="2978696"/>
+          <a:ext cx="993304" cy="914400"/>
+        </p:xfrm>
+        <a:graphic>
+          <a:graphicData uri="http://schemas.openxmlformats.org/drawingml/2006/table">
+            <a:tbl>
+              <a:tblPr firstRow="1" bandRow="1">
+                <a:tableStyleId>{5C22544A-7EE6-4342-B048-85BDC9FD1C3A}</a:tableStyleId>
+              </a:tblPr>
+              <a:tblGrid>
+                <a:gridCol w="496652"/>
+                <a:gridCol w="496652"/>
+              </a:tblGrid>
+              <a:tr h="457200">
+                <a:tc>
+                  <a:txBody>
+                    <a:bodyPr/>
+                    <a:lstStyle/>
+                    <a:p>
+                      <a:endParaRPr lang="en-US" dirty="0"/>
+                    </a:p>
+                  </a:txBody>
+                  <a:tcPr/>
+                </a:tc>
+                <a:tc>
+                  <a:txBody>
+                    <a:bodyPr/>
+                    <a:lstStyle/>
+                    <a:p>
+                      <a:endParaRPr lang="en-US" dirty="0"/>
+                    </a:p>
+                  </a:txBody>
+                  <a:tcPr/>
+                </a:tc>
+              </a:tr>
+              <a:tr h="457200">
+                <a:tc>
+                  <a:txBody>
+                    <a:bodyPr/>
+                    <a:lstStyle/>
+                    <a:p>
+                      <a:endParaRPr lang="en-US"/>
+                    </a:p>
+                  </a:txBody>
+                  <a:tcPr/>
+                </a:tc>
+                <a:tc>
+                  <a:txBody>
+                    <a:bodyPr/>
+                    <a:lstStyle/>
+                    <a:p>
+                      <a:endParaRPr lang="en-US" dirty="0"/>
+                    </a:p>
+                  </a:txBody>
+                  <a:tcPr/>
+                </a:tc>
+              </a:tr>
+            </a:tbl>
+          </a:graphicData>
+        </a:graphic>
+      </p:graphicFrame>
+      <p:grpSp>
+        <p:nvGrpSpPr>
+          <p:cNvPr id="9" name="Group 8"/>
+          <p:cNvGrpSpPr/>
+          <p:nvPr/>
+        </p:nvGrpSpPr>
+        <p:grpSpPr>
+          <a:xfrm rot="2400000">
+            <a:off x="5454352" y="4121696"/>
+            <a:ext cx="914400" cy="914400"/>
+            <a:chOff x="5029200" y="4343400"/>
+            <a:chExt cx="914400" cy="914400"/>
+          </a:xfrm>
+        </p:grpSpPr>
+        <p:sp>
+          <p:nvSpPr>
+            <p:cNvPr id="5" name="Oval 4"/>
+            <p:cNvSpPr/>
+            <p:nvPr/>
+          </p:nvSpPr>
+          <p:spPr>
+            <a:xfrm>
+              <a:off x="5029200" y="4343400"/>
+              <a:ext cx="457200" cy="457200"/>
+            </a:xfrm>
+            <a:prstGeom prst="ellipse">
+              <a:avLst/>
+            </a:prstGeom>
+          </p:spPr>
+          <p:style>
+            <a:lnRef idx="1">
+              <a:schemeClr val="accent1"/>
+            </a:lnRef>
+            <a:fillRef idx="3">
+              <a:schemeClr val="accent1"/>
+            </a:fillRef>
+            <a:effectRef idx="2">
+              <a:schemeClr val="accent1"/>
+            </a:effectRef>
+            <a:fontRef idx="minor">
+              <a:schemeClr val="lt1"/>
+            </a:fontRef>
+          </p:style>
+          <p:txBody>
+            <a:bodyPr rtlCol="0" anchor="ctr"/>
+            <a:lstStyle/>
+            <a:p>
+              <a:pPr algn="ctr"/>
+              <a:endParaRPr lang="en-US"/>
+            </a:p>
+          </p:txBody>
+        </p:sp>
+        <p:sp>
+          <p:nvSpPr>
+            <p:cNvPr id="6" name="Oval 5"/>
+            <p:cNvSpPr/>
+            <p:nvPr/>
+          </p:nvSpPr>
+          <p:spPr>
+            <a:xfrm>
+              <a:off x="5486400" y="4343400"/>
+              <a:ext cx="457200" cy="457200"/>
+            </a:xfrm>
+            <a:prstGeom prst="ellipse">
+              <a:avLst/>
+            </a:prstGeom>
+          </p:spPr>
+          <p:style>
+            <a:lnRef idx="1">
+              <a:schemeClr val="accent1"/>
+            </a:lnRef>
+            <a:fillRef idx="3">
+              <a:schemeClr val="accent1"/>
+            </a:fillRef>
+            <a:effectRef idx="2">
+              <a:schemeClr val="accent1"/>
+            </a:effectRef>
+            <a:fontRef idx="minor">
+              <a:schemeClr val="lt1"/>
+            </a:fontRef>
+          </p:style>
+          <p:txBody>
+            <a:bodyPr rtlCol="0" anchor="ctr"/>
+            <a:lstStyle/>
+            <a:p>
+              <a:pPr algn="ctr"/>
+              <a:endParaRPr lang="en-US"/>
+            </a:p>
+          </p:txBody>
+        </p:sp>
+        <p:sp>
+          <p:nvSpPr>
+            <p:cNvPr id="7" name="Oval 6"/>
+            <p:cNvSpPr/>
+            <p:nvPr/>
+          </p:nvSpPr>
+          <p:spPr>
+            <a:xfrm>
+              <a:off x="5029200" y="4800600"/>
+              <a:ext cx="457200" cy="457200"/>
+            </a:xfrm>
+            <a:prstGeom prst="ellipse">
+              <a:avLst/>
+            </a:prstGeom>
+          </p:spPr>
+          <p:style>
+            <a:lnRef idx="1">
+              <a:schemeClr val="accent1"/>
+            </a:lnRef>
+            <a:fillRef idx="3">
+              <a:schemeClr val="accent1"/>
+            </a:fillRef>
+            <a:effectRef idx="2">
+              <a:schemeClr val="accent1"/>
+            </a:effectRef>
+            <a:fontRef idx="minor">
+              <a:schemeClr val="lt1"/>
+            </a:fontRef>
+          </p:style>
+          <p:txBody>
+            <a:bodyPr rtlCol="0" anchor="ctr"/>
+            <a:lstStyle/>
+            <a:p>
+              <a:pPr algn="ctr"/>
+              <a:endParaRPr lang="en-US"/>
+            </a:p>
+          </p:txBody>
+        </p:sp>
+        <p:sp>
+          <p:nvSpPr>
+            <p:cNvPr id="8" name="Oval 7"/>
+            <p:cNvSpPr/>
+            <p:nvPr/>
+          </p:nvSpPr>
+          <p:spPr>
+            <a:xfrm>
+              <a:off x="5486400" y="4800600"/>
+              <a:ext cx="457200" cy="457200"/>
+            </a:xfrm>
+            <a:prstGeom prst="ellipse">
+              <a:avLst/>
+            </a:prstGeom>
+          </p:spPr>
+          <p:style>
+            <a:lnRef idx="1">
+              <a:schemeClr val="accent1"/>
+            </a:lnRef>
+            <a:fillRef idx="3">
+              <a:schemeClr val="accent1"/>
+            </a:fillRef>
+            <a:effectRef idx="2">
+              <a:schemeClr val="accent1"/>
+            </a:effectRef>
+            <a:fontRef idx="minor">
+              <a:schemeClr val="lt1"/>
+            </a:fontRef>
+          </p:style>
+          <p:txBody>
+            <a:bodyPr rtlCol="0" anchor="ctr"/>
+            <a:lstStyle/>
+            <a:p>
+              <a:pPr algn="ctr"/>
+              <a:endParaRPr lang="en-US"/>
+            </a:p>
+          </p:txBody>
+        </p:sp>
+      </p:grpSp>
+      <p:cxnSp>
+        <p:nvCxnSpPr>
+          <p:cNvPr id="11" name="Elbow Connector 10"/>
+          <p:cNvCxnSpPr/>
+          <p:nvPr/>
+        </p:nvCxnSpPr>
+        <p:spPr>
+          <a:xfrm rot="3000000">
+            <a:off x="6825952" y="5264696"/>
+            <a:ext cx="986408" cy="828600"/>
+          </a:xfrm>
+          <a:prstGeom prst="bentConnector3">
+            <a:avLst/>
+          </a:prstGeom>
+          <a:ln>
+            <a:headEnd type="arrow"/>
+            <a:tailEnd type="arrow"/>
+          </a:ln>
+        </p:spPr>
+        <p:style>
+          <a:lnRef idx="2">
+            <a:schemeClr val="accent1"/>
+          </a:lnRef>
+          <a:fillRef idx="0">
+            <a:schemeClr val="accent1"/>
+          </a:fillRef>
+          <a:effectRef idx="1">
+            <a:schemeClr val="accent1"/>
+          </a:effectRef>
+          <a:fontRef idx="minor">
+            <a:schemeClr val="tx1"/>
+          </a:fontRef>
+        </p:style>
+      </p:cxnSp>
+    </p:spTree>
+    <p:extLst>
+      <p:ext uri="{BB962C8B-B14F-4D97-AF65-F5344CB8AC3E}">
+        <p14:creationId xmlns:p14="http://schemas.microsoft.com/office/powerpoint/2010/main" val="2570512676"/>
+      </p:ext>
+    </p:extLst>
+  </p:cSld>
+  <p:clrMapOvr>
+    <a:masterClrMapping/>
+  </p:clrMapOvr>
+</p:sld>
+</file>
+
 <file path=ppt/theme/theme1.xml><?xml version="1.0" encoding="utf-8"?>
 <a:theme xmlns:a="http://schemas.openxmlformats.org/drawingml/2006/main" name="Office Theme">
   <a:themeElements>

</xml_diff>